<commit_message>
Kontynuacja prezentacji dot. Etykiet
</commit_message>
<xml_diff>
--- a/10. Git - tutorial - Labels.pptx
+++ b/10. Git - tutorial - Labels.pptx
@@ -5,16 +5,22 @@
     <p:sldMasterId id="2147483648" r:id="rId1"/>
   </p:sldMasterIdLst>
   <p:notesMasterIdLst>
-    <p:notesMasterId r:id="rId9"/>
+    <p:notesMasterId r:id="rId15"/>
   </p:notesMasterIdLst>
   <p:sldIdLst>
     <p:sldId id="310" r:id="rId2"/>
     <p:sldId id="309" r:id="rId3"/>
     <p:sldId id="311" r:id="rId4"/>
-    <p:sldId id="312" r:id="rId5"/>
-    <p:sldId id="313" r:id="rId6"/>
-    <p:sldId id="315" r:id="rId7"/>
-    <p:sldId id="314" r:id="rId8"/>
+    <p:sldId id="316" r:id="rId5"/>
+    <p:sldId id="317" r:id="rId6"/>
+    <p:sldId id="312" r:id="rId7"/>
+    <p:sldId id="313" r:id="rId8"/>
+    <p:sldId id="315" r:id="rId9"/>
+    <p:sldId id="314" r:id="rId10"/>
+    <p:sldId id="318" r:id="rId11"/>
+    <p:sldId id="319" r:id="rId12"/>
+    <p:sldId id="320" r:id="rId13"/>
+    <p:sldId id="321" r:id="rId14"/>
   </p:sldIdLst>
   <p:sldSz cx="9144000" cy="5143500" type="screen16x9"/>
   <p:notesSz cx="6858000" cy="9144000"/>
@@ -115,7 +121,7 @@
   </p:defaultTextStyle>
   <p:extLst>
     <p:ext uri="{EFAFB233-063F-42B5-8137-9DF3F51BA10A}">
-      <p15:sldGuideLst xmlns:p15="http://schemas.microsoft.com/office/powerpoint/2012/main" xmlns="">
+      <p15:sldGuideLst xmlns="" xmlns:p15="http://schemas.microsoft.com/office/powerpoint/2012/main">
         <p15:guide id="1" orient="horz" pos="1620">
           <p15:clr>
             <a:srgbClr val="A4A3A4"/>
@@ -214,7 +220,7 @@
           <a:p>
             <a:fld id="{F4CC630C-9AF6-49E5-9919-D038F5C57BFC}" type="datetimeFigureOut">
               <a:rPr lang="en-US" smtClean="0"/>
-              <a:t>5/5/2021</a:t>
+              <a:t>5/25/2021</a:t>
             </a:fld>
             <a:endParaRPr lang="en-US"/>
           </a:p>
@@ -663,7 +669,7 @@
           <a:p>
             <a:fld id="{F19922E3-32CA-40BB-949D-A04DA951D7AE}" type="datetimeFigureOut">
               <a:rPr lang="en-US" smtClean="0"/>
-              <a:t>5/5/2021</a:t>
+              <a:t>5/25/2021</a:t>
             </a:fld>
             <a:endParaRPr lang="en-US"/>
           </a:p>
@@ -833,7 +839,7 @@
           <a:p>
             <a:fld id="{F19922E3-32CA-40BB-949D-A04DA951D7AE}" type="datetimeFigureOut">
               <a:rPr lang="en-US" smtClean="0"/>
-              <a:t>5/5/2021</a:t>
+              <a:t>5/25/2021</a:t>
             </a:fld>
             <a:endParaRPr lang="en-US"/>
           </a:p>
@@ -1013,7 +1019,7 @@
           <a:p>
             <a:fld id="{F19922E3-32CA-40BB-949D-A04DA951D7AE}" type="datetimeFigureOut">
               <a:rPr lang="en-US" smtClean="0"/>
-              <a:t>5/5/2021</a:t>
+              <a:t>5/25/2021</a:t>
             </a:fld>
             <a:endParaRPr lang="en-US"/>
           </a:p>
@@ -1183,7 +1189,7 @@
           <a:p>
             <a:fld id="{F19922E3-32CA-40BB-949D-A04DA951D7AE}" type="datetimeFigureOut">
               <a:rPr lang="en-US" smtClean="0"/>
-              <a:t>5/5/2021</a:t>
+              <a:t>5/25/2021</a:t>
             </a:fld>
             <a:endParaRPr lang="en-US"/>
           </a:p>
@@ -1429,7 +1435,7 @@
           <a:p>
             <a:fld id="{F19922E3-32CA-40BB-949D-A04DA951D7AE}" type="datetimeFigureOut">
               <a:rPr lang="en-US" smtClean="0"/>
-              <a:t>5/5/2021</a:t>
+              <a:t>5/25/2021</a:t>
             </a:fld>
             <a:endParaRPr lang="en-US"/>
           </a:p>
@@ -1717,7 +1723,7 @@
           <a:p>
             <a:fld id="{F19922E3-32CA-40BB-949D-A04DA951D7AE}" type="datetimeFigureOut">
               <a:rPr lang="en-US" smtClean="0"/>
-              <a:t>5/5/2021</a:t>
+              <a:t>5/25/2021</a:t>
             </a:fld>
             <a:endParaRPr lang="en-US"/>
           </a:p>
@@ -2144,7 +2150,7 @@
           <a:p>
             <a:fld id="{F19922E3-32CA-40BB-949D-A04DA951D7AE}" type="datetimeFigureOut">
               <a:rPr lang="en-US" smtClean="0"/>
-              <a:t>5/5/2021</a:t>
+              <a:t>5/25/2021</a:t>
             </a:fld>
             <a:endParaRPr lang="en-US"/>
           </a:p>
@@ -2262,7 +2268,7 @@
           <a:p>
             <a:fld id="{F19922E3-32CA-40BB-949D-A04DA951D7AE}" type="datetimeFigureOut">
               <a:rPr lang="en-US" smtClean="0"/>
-              <a:t>5/5/2021</a:t>
+              <a:t>5/25/2021</a:t>
             </a:fld>
             <a:endParaRPr lang="en-US"/>
           </a:p>
@@ -2357,7 +2363,7 @@
           <a:p>
             <a:fld id="{F19922E3-32CA-40BB-949D-A04DA951D7AE}" type="datetimeFigureOut">
               <a:rPr lang="en-US" smtClean="0"/>
-              <a:t>5/5/2021</a:t>
+              <a:t>5/25/2021</a:t>
             </a:fld>
             <a:endParaRPr lang="en-US"/>
           </a:p>
@@ -2634,7 +2640,7 @@
           <a:p>
             <a:fld id="{F19922E3-32CA-40BB-949D-A04DA951D7AE}" type="datetimeFigureOut">
               <a:rPr lang="en-US" smtClean="0"/>
-              <a:t>5/5/2021</a:t>
+              <a:t>5/25/2021</a:t>
             </a:fld>
             <a:endParaRPr lang="en-US"/>
           </a:p>
@@ -2887,7 +2893,7 @@
           <a:p>
             <a:fld id="{F19922E3-32CA-40BB-949D-A04DA951D7AE}" type="datetimeFigureOut">
               <a:rPr lang="en-US" smtClean="0"/>
-              <a:t>5/5/2021</a:t>
+              <a:t>5/25/2021</a:t>
             </a:fld>
             <a:endParaRPr lang="en-US"/>
           </a:p>
@@ -3109,7 +3115,7 @@
           <a:p>
             <a:fld id="{F19922E3-32CA-40BB-949D-A04DA951D7AE}" type="datetimeFigureOut">
               <a:rPr lang="en-US" smtClean="0"/>
-              <a:t>5/5/2021</a:t>
+              <a:t>5/25/2021</a:t>
             </a:fld>
             <a:endParaRPr lang="en-US"/>
           </a:p>
@@ -3583,6 +3589,762 @@
 </p:sld>
 </file>
 
+<file path=ppt/slides/slide10.xml><?xml version="1.0" encoding="utf-8"?>
+<p:sld xmlns:a="http://schemas.openxmlformats.org/drawingml/2006/main" xmlns:r="http://schemas.openxmlformats.org/officeDocument/2006/relationships" xmlns:p="http://schemas.openxmlformats.org/presentationml/2006/main">
+  <p:cSld>
+    <p:spTree>
+      <p:nvGrpSpPr>
+        <p:cNvPr id="1" name=""/>
+        <p:cNvGrpSpPr/>
+        <p:nvPr/>
+      </p:nvGrpSpPr>
+      <p:grpSpPr>
+        <a:xfrm>
+          <a:off x="0" y="0"/>
+          <a:ext cx="0" cy="0"/>
+          <a:chOff x="0" y="0"/>
+          <a:chExt cx="0" cy="0"/>
+        </a:xfrm>
+      </p:grpSpPr>
+      <p:sp>
+        <p:nvSpPr>
+          <p:cNvPr id="3" name="Symbol zastępczy zawartości 2"/>
+          <p:cNvSpPr>
+            <a:spLocks noGrp="1"/>
+          </p:cNvSpPr>
+          <p:nvPr>
+            <p:ph idx="1"/>
+          </p:nvPr>
+        </p:nvSpPr>
+        <p:spPr>
+          <a:xfrm>
+            <a:off x="457200" y="987574"/>
+            <a:ext cx="8229600" cy="3607048"/>
+          </a:xfrm>
+        </p:spPr>
+        <p:txBody>
+          <a:bodyPr>
+            <a:normAutofit/>
+          </a:bodyPr>
+          <a:lstStyle/>
+          <a:p>
+            <a:r>
+              <a:rPr lang="pl-PL" sz="1600" dirty="0" smtClean="0">
+                <a:latin typeface="+mj-lt"/>
+              </a:rPr>
+              <a:t>Twórz etykiety na możliwie najniższym poziomie</a:t>
+            </a:r>
+          </a:p>
+          <a:p>
+            <a:r>
+              <a:rPr lang="pl-PL" sz="1600" dirty="0" smtClean="0">
+                <a:latin typeface="+mj-lt"/>
+              </a:rPr>
+              <a:t>Ponieważ etykiety grupowe wiążą się z niższymi grupami i projektami,</a:t>
+            </a:r>
+            <a:br>
+              <a:rPr lang="pl-PL" sz="1600" dirty="0" smtClean="0">
+                <a:latin typeface="+mj-lt"/>
+              </a:rPr>
+            </a:br>
+            <a:r>
+              <a:rPr lang="pl-PL" sz="1600" dirty="0" smtClean="0">
+                <a:latin typeface="+mj-lt"/>
+              </a:rPr>
+              <a:t>nieograniczone tworzenie etykiet grupowych może być przyczyną nieładu i dezorientacji. Przykładowo jeżeli wiele zespołów wprowadzi etykietę high-</a:t>
+            </a:r>
+            <a:r>
+              <a:rPr lang="pl-PL" sz="1600" dirty="0" err="1" smtClean="0">
+                <a:latin typeface="+mj-lt"/>
+              </a:rPr>
+              <a:t>priority</a:t>
+            </a:r>
+            <a:r>
+              <a:rPr lang="pl-PL" sz="1600" dirty="0" smtClean="0">
+                <a:latin typeface="+mj-lt"/>
+              </a:rPr>
+              <a:t> na poziomie grupy, wówczas wszystkie podgrupy przyjmą tą etykietę.</a:t>
+            </a:r>
+          </a:p>
+          <a:p>
+            <a:r>
+              <a:rPr lang="pl-PL" sz="1600" dirty="0" smtClean="0">
+                <a:latin typeface="+mj-lt"/>
+              </a:rPr>
+              <a:t>Etykiety grupowe powinny być wykorzystywane na poziomie grupy, dla kilku projektów, lub podgrup, jednocześnie. Przykładowymi zastosowaniami są:</a:t>
+            </a:r>
+          </a:p>
+          <a:p>
+            <a:r>
+              <a:rPr lang="pl-PL" sz="1600" dirty="0" smtClean="0">
+                <a:latin typeface="+mj-lt"/>
+              </a:rPr>
+              <a:t>Etykiety dotyczące kadry kierowniczej </a:t>
+            </a:r>
+            <a:r>
+              <a:rPr lang="pl-PL" sz="1600" dirty="0"/>
+              <a:t>(np. </a:t>
+            </a:r>
+            <a:r>
+              <a:rPr lang="pl-PL" sz="1600" b="1" dirty="0"/>
+              <a:t>Dyrektor ds. Marketingu</a:t>
+            </a:r>
+            <a:r>
+              <a:rPr lang="pl-PL" sz="1600" dirty="0"/>
+              <a:t> , </a:t>
+            </a:r>
+            <a:r>
+              <a:rPr lang="pl-PL" sz="1600" b="1" dirty="0"/>
+              <a:t>dyrektor generalny</a:t>
+            </a:r>
+            <a:r>
+              <a:rPr lang="pl-PL" sz="1600" dirty="0"/>
+              <a:t> itp.)</a:t>
+            </a:r>
+            <a:r>
+              <a:rPr lang="pl-PL" sz="1600" dirty="0" smtClean="0">
+                <a:latin typeface="+mj-lt"/>
+              </a:rPr>
+              <a:t> Pomagają zrozumieć priorytet zagadnień.</a:t>
+            </a:r>
+          </a:p>
+          <a:p>
+            <a:r>
+              <a:rPr lang="pl-PL" sz="1600" dirty="0" smtClean="0">
+                <a:latin typeface="+mj-lt"/>
+              </a:rPr>
+              <a:t>Priorytet wykonawczy </a:t>
+            </a:r>
+            <a:r>
+              <a:rPr lang="pl-PL" sz="1600" dirty="0"/>
+              <a:t>(priorytet </a:t>
+            </a:r>
+            <a:r>
+              <a:rPr lang="pl-PL" sz="1600" b="1" dirty="0"/>
+              <a:t>CMO: 1</a:t>
+            </a:r>
+            <a:r>
+              <a:rPr lang="pl-PL" sz="1600" dirty="0"/>
+              <a:t> , </a:t>
+            </a:r>
+            <a:r>
+              <a:rPr lang="pl-PL" sz="1600" b="1" dirty="0"/>
+              <a:t>priorytet CMO: 2</a:t>
+            </a:r>
+            <a:r>
+              <a:rPr lang="pl-PL" sz="1600" dirty="0"/>
+              <a:t> itd.)</a:t>
+            </a:r>
+            <a:r>
+              <a:rPr lang="pl-PL" sz="1600" dirty="0" smtClean="0">
+                <a:latin typeface="+mj-lt"/>
+              </a:rPr>
+              <a:t>. Pomagają zrozumieć priorytet poszczególnych zagadnień</a:t>
+            </a:r>
+          </a:p>
+          <a:p>
+            <a:r>
+              <a:rPr lang="pl-PL" sz="1600" dirty="0" smtClean="0">
+                <a:latin typeface="+mj-lt"/>
+              </a:rPr>
+              <a:t>Motyw wykonawczy </a:t>
+            </a:r>
+            <a:r>
+              <a:rPr lang="en-US" sz="1600" dirty="0"/>
+              <a:t>( </a:t>
+            </a:r>
+            <a:r>
+              <a:rPr lang="en-US" sz="1600" b="1" dirty="0"/>
+              <a:t>CMO :: Agility</a:t>
+            </a:r>
+            <a:r>
+              <a:rPr lang="en-US" sz="1600" dirty="0"/>
+              <a:t> , </a:t>
+            </a:r>
+            <a:r>
+              <a:rPr lang="en-US" sz="1600" b="1" dirty="0"/>
+              <a:t>CMO :: Efficiency</a:t>
+            </a:r>
+            <a:r>
+              <a:rPr lang="en-US" sz="1600" dirty="0"/>
+              <a:t> , </a:t>
+            </a:r>
+            <a:r>
+              <a:rPr lang="en-US" sz="1600" b="1" dirty="0"/>
+              <a:t>CMO :: Commit</a:t>
+            </a:r>
+            <a:r>
+              <a:rPr lang="en-US" sz="1600" dirty="0"/>
+              <a:t> </a:t>
+            </a:r>
+            <a:r>
+              <a:rPr lang="en-US" sz="1600" dirty="0" err="1"/>
+              <a:t>itp</a:t>
+            </a:r>
+            <a:r>
+              <a:rPr lang="en-US" sz="1600" dirty="0"/>
+              <a:t>.)</a:t>
+            </a:r>
+            <a:endParaRPr lang="pl-PL" sz="1600" dirty="0" smtClean="0">
+              <a:latin typeface="+mj-lt"/>
+            </a:endParaRPr>
+          </a:p>
+          <a:p>
+            <a:r>
+              <a:rPr lang="pl-PL" sz="1600" dirty="0" smtClean="0">
+                <a:latin typeface="+mj-lt"/>
+              </a:rPr>
+              <a:t>Etykiety „zespołu” </a:t>
+            </a:r>
+            <a:r>
+              <a:rPr lang="en-US" sz="1600" dirty="0"/>
+              <a:t>( </a:t>
+            </a:r>
+            <a:r>
+              <a:rPr lang="en-US" sz="1600" b="1" dirty="0"/>
+              <a:t>Strategic Marketing</a:t>
+            </a:r>
+            <a:r>
+              <a:rPr lang="en-US" sz="1600" dirty="0"/>
+              <a:t> , </a:t>
+            </a:r>
+            <a:r>
+              <a:rPr lang="en-US" sz="1600" b="1" dirty="0"/>
+              <a:t>Corporate Marketing</a:t>
+            </a:r>
+            <a:r>
+              <a:rPr lang="en-US" sz="1600" dirty="0"/>
+              <a:t> , </a:t>
+            </a:r>
+            <a:r>
+              <a:rPr lang="en-US" sz="1600" dirty="0" err="1"/>
+              <a:t>itd</a:t>
+            </a:r>
+            <a:r>
+              <a:rPr lang="en-US" sz="1600" dirty="0"/>
+              <a:t>.)</a:t>
+            </a:r>
+            <a:endParaRPr lang="pl-PL" sz="1600" dirty="0" smtClean="0">
+              <a:latin typeface="+mj-lt"/>
+            </a:endParaRPr>
+          </a:p>
+        </p:txBody>
+      </p:sp>
+    </p:spTree>
+    <p:extLst>
+      <p:ext uri="{BB962C8B-B14F-4D97-AF65-F5344CB8AC3E}">
+        <p14:creationId xmlns:p14="http://schemas.microsoft.com/office/powerpoint/2010/main" val="3069324644"/>
+      </p:ext>
+    </p:extLst>
+  </p:cSld>
+  <p:clrMapOvr>
+    <a:masterClrMapping/>
+  </p:clrMapOvr>
+  <p:timing>
+    <p:tnLst>
+      <p:par>
+        <p:cTn id="1" dur="indefinite" restart="never" nodeType="tmRoot"/>
+      </p:par>
+    </p:tnLst>
+  </p:timing>
+</p:sld>
+</file>
+
+<file path=ppt/slides/slide11.xml><?xml version="1.0" encoding="utf-8"?>
+<p:sld xmlns:a="http://schemas.openxmlformats.org/drawingml/2006/main" xmlns:r="http://schemas.openxmlformats.org/officeDocument/2006/relationships" xmlns:p="http://schemas.openxmlformats.org/presentationml/2006/main">
+  <p:cSld>
+    <p:spTree>
+      <p:nvGrpSpPr>
+        <p:cNvPr id="1" name=""/>
+        <p:cNvGrpSpPr/>
+        <p:nvPr/>
+      </p:nvGrpSpPr>
+      <p:grpSpPr>
+        <a:xfrm>
+          <a:off x="0" y="0"/>
+          <a:ext cx="0" cy="0"/>
+          <a:chOff x="0" y="0"/>
+          <a:chExt cx="0" cy="0"/>
+        </a:xfrm>
+      </p:grpSpPr>
+      <p:sp>
+        <p:nvSpPr>
+          <p:cNvPr id="3" name="Symbol zastępczy zawartości 2"/>
+          <p:cNvSpPr>
+            <a:spLocks noGrp="1"/>
+          </p:cNvSpPr>
+          <p:nvPr>
+            <p:ph idx="1"/>
+          </p:nvPr>
+        </p:nvSpPr>
+        <p:spPr>
+          <a:xfrm>
+            <a:off x="457200" y="987574"/>
+            <a:ext cx="8229600" cy="3607048"/>
+          </a:xfrm>
+        </p:spPr>
+        <p:txBody>
+          <a:bodyPr>
+            <a:normAutofit/>
+          </a:bodyPr>
+          <a:lstStyle/>
+          <a:p>
+            <a:r>
+              <a:rPr lang="pl-PL" sz="1600" dirty="0" smtClean="0">
+                <a:latin typeface="+mj-lt"/>
+              </a:rPr>
+              <a:t>Jeżeli nie jesteś pewien czy powinieneś utworzyć etykietę na </a:t>
+            </a:r>
+            <a:br>
+              <a:rPr lang="pl-PL" sz="1600" dirty="0" smtClean="0">
+                <a:latin typeface="+mj-lt"/>
+              </a:rPr>
+            </a:br>
+            <a:r>
+              <a:rPr lang="pl-PL" sz="1600" dirty="0" smtClean="0">
+                <a:latin typeface="+mj-lt"/>
+              </a:rPr>
+              <a:t>poziomie grupy, utwórz ją na poziomie projektu, zagadnienia,</a:t>
+            </a:r>
+            <a:br>
+              <a:rPr lang="pl-PL" sz="1600" dirty="0" smtClean="0">
+                <a:latin typeface="+mj-lt"/>
+              </a:rPr>
+            </a:br>
+            <a:r>
+              <a:rPr lang="pl-PL" sz="1600" dirty="0" smtClean="0">
+                <a:latin typeface="+mj-lt"/>
+              </a:rPr>
+              <a:t>a w przyszłości będziesz mógł, w razie potrzeby,</a:t>
+            </a:r>
+            <a:br>
+              <a:rPr lang="pl-PL" sz="1600" dirty="0" smtClean="0">
+                <a:latin typeface="+mj-lt"/>
+              </a:rPr>
+            </a:br>
+            <a:r>
+              <a:rPr lang="pl-PL" sz="1600" dirty="0" smtClean="0">
+                <a:latin typeface="+mj-lt"/>
+              </a:rPr>
+              <a:t>przenieść ją na wyższy poziom.</a:t>
+            </a:r>
+          </a:p>
+        </p:txBody>
+      </p:sp>
+    </p:spTree>
+    <p:extLst>
+      <p:ext uri="{BB962C8B-B14F-4D97-AF65-F5344CB8AC3E}">
+        <p14:creationId xmlns:p14="http://schemas.microsoft.com/office/powerpoint/2010/main" val="1790341225"/>
+      </p:ext>
+    </p:extLst>
+  </p:cSld>
+  <p:clrMapOvr>
+    <a:masterClrMapping/>
+  </p:clrMapOvr>
+  <p:timing>
+    <p:tnLst>
+      <p:par>
+        <p:cTn id="1" dur="indefinite" restart="never" nodeType="tmRoot"/>
+      </p:par>
+    </p:tnLst>
+  </p:timing>
+</p:sld>
+</file>
+
+<file path=ppt/slides/slide12.xml><?xml version="1.0" encoding="utf-8"?>
+<p:sld xmlns:a="http://schemas.openxmlformats.org/drawingml/2006/main" xmlns:r="http://schemas.openxmlformats.org/officeDocument/2006/relationships" xmlns:p="http://schemas.openxmlformats.org/presentationml/2006/main">
+  <p:cSld>
+    <p:spTree>
+      <p:nvGrpSpPr>
+        <p:cNvPr id="1" name=""/>
+        <p:cNvGrpSpPr/>
+        <p:nvPr/>
+      </p:nvGrpSpPr>
+      <p:grpSpPr>
+        <a:xfrm>
+          <a:off x="0" y="0"/>
+          <a:ext cx="0" cy="0"/>
+          <a:chOff x="0" y="0"/>
+          <a:chExt cx="0" cy="0"/>
+        </a:xfrm>
+      </p:grpSpPr>
+      <p:sp>
+        <p:nvSpPr>
+          <p:cNvPr id="3" name="Symbol zastępczy zawartości 2"/>
+          <p:cNvSpPr>
+            <a:spLocks noGrp="1"/>
+          </p:cNvSpPr>
+          <p:nvPr>
+            <p:ph idx="1"/>
+          </p:nvPr>
+        </p:nvSpPr>
+        <p:spPr>
+          <a:xfrm>
+            <a:off x="457200" y="987574"/>
+            <a:ext cx="8229600" cy="3607048"/>
+          </a:xfrm>
+        </p:spPr>
+        <p:txBody>
+          <a:bodyPr>
+            <a:normAutofit/>
+          </a:bodyPr>
+          <a:lstStyle/>
+          <a:p>
+            <a:r>
+              <a:rPr lang="pl-PL" sz="1600" dirty="0" smtClean="0">
+                <a:latin typeface="+mj-lt"/>
+              </a:rPr>
+              <a:t>Stosuj krótkie nazwy etykiet.</a:t>
+            </a:r>
+            <a:r>
+              <a:rPr lang="pl-PL" sz="1600" dirty="0">
+                <a:latin typeface="+mj-lt"/>
+              </a:rPr>
+              <a:t> </a:t>
+            </a:r>
+            <a:r>
+              <a:rPr lang="pl-PL" sz="1600" dirty="0" smtClean="0">
+                <a:latin typeface="+mj-lt"/>
+              </a:rPr>
+              <a:t>Przy tworzeniu i definiowaniu etykiet staraj się używać krótkich nazw. Etykiety dłuższe niż 25 znaków mogą być ucinane w środowisku graficznym </a:t>
+            </a:r>
+            <a:r>
+              <a:rPr lang="pl-PL" sz="1600" dirty="0" err="1" smtClean="0">
+                <a:latin typeface="+mj-lt"/>
+              </a:rPr>
+              <a:t>GitLaba</a:t>
+            </a:r>
+            <a:r>
+              <a:rPr lang="pl-PL" sz="1600" dirty="0" smtClean="0">
+                <a:latin typeface="+mj-lt"/>
+              </a:rPr>
+              <a:t>.</a:t>
+            </a:r>
+          </a:p>
+          <a:p>
+            <a:r>
+              <a:rPr lang="pl-PL" sz="1600" dirty="0" smtClean="0">
+                <a:latin typeface="+mj-lt"/>
+              </a:rPr>
+              <a:t>Tworząc etykiety upewnij się, że pola opisowe zawierają odpowiednie </a:t>
+            </a:r>
+            <a:r>
+              <a:rPr lang="pl-PL" sz="1600" dirty="0" err="1" smtClean="0">
+                <a:latin typeface="+mj-lt"/>
+              </a:rPr>
+              <a:t>iformacje</a:t>
+            </a:r>
+            <a:r>
+              <a:rPr lang="pl-PL" sz="1600" dirty="0" smtClean="0">
+                <a:latin typeface="+mj-lt"/>
+              </a:rPr>
+              <a:t>:</a:t>
+            </a:r>
+          </a:p>
+          <a:p>
+            <a:pPr lvl="1"/>
+            <a:r>
+              <a:rPr lang="pl-PL" sz="1200" dirty="0" smtClean="0">
+                <a:latin typeface="+mj-lt"/>
+              </a:rPr>
+              <a:t>Kiedy etykieta powinna być przypisywana</a:t>
+            </a:r>
+          </a:p>
+          <a:p>
+            <a:pPr lvl="1"/>
+            <a:r>
+              <a:rPr lang="pl-PL" sz="1200" dirty="0" smtClean="0">
+                <a:latin typeface="+mj-lt"/>
+              </a:rPr>
+              <a:t>Jej cel lub przeznaczenie</a:t>
+            </a:r>
+          </a:p>
+          <a:p>
+            <a:pPr lvl="1"/>
+            <a:r>
+              <a:rPr lang="pl-PL" sz="1200" dirty="0" smtClean="0">
+                <a:latin typeface="+mj-lt"/>
+              </a:rPr>
+              <a:t>Osoby odpowiedzialne za dane zagadnienie</a:t>
+            </a:r>
+          </a:p>
+          <a:p>
+            <a:pPr marL="457200" lvl="1" indent="0">
+              <a:buNone/>
+            </a:pPr>
+            <a:r>
+              <a:rPr lang="pl-PL" sz="1200" dirty="0" smtClean="0">
+                <a:latin typeface="+mj-lt"/>
+              </a:rPr>
+              <a:t>Będą one prezentowane jako </a:t>
+            </a:r>
+            <a:r>
+              <a:rPr lang="pl-PL" sz="1200" dirty="0" err="1" smtClean="0">
+                <a:latin typeface="+mj-lt"/>
+              </a:rPr>
+              <a:t>toolTip</a:t>
+            </a:r>
+            <a:r>
+              <a:rPr lang="pl-PL" sz="1200" dirty="0" smtClean="0">
+                <a:latin typeface="+mj-lt"/>
+              </a:rPr>
+              <a:t> nad etykietą</a:t>
+            </a:r>
+          </a:p>
+          <a:p>
+            <a:pPr marL="457200" lvl="1" indent="0">
+              <a:buNone/>
+            </a:pPr>
+            <a:endParaRPr lang="pl-PL" sz="1200" dirty="0">
+              <a:latin typeface="+mj-lt"/>
+            </a:endParaRPr>
+          </a:p>
+          <a:p>
+            <a:pPr indent="-285750"/>
+            <a:r>
+              <a:rPr lang="pl-PL" sz="1600" dirty="0" smtClean="0">
+                <a:latin typeface="+mj-lt"/>
+              </a:rPr>
+              <a:t>Grupuj etykiety stosując odpowiednią konwencję nadawania nazw, np. z wykorzystaniem prefiksów (np. </a:t>
+            </a:r>
+            <a:r>
+              <a:rPr lang="pl-PL" sz="1600" dirty="0" err="1" smtClean="0">
+                <a:latin typeface="+mj-lt"/>
+              </a:rPr>
+              <a:t>dev</a:t>
+            </a:r>
+            <a:r>
+              <a:rPr lang="pl-PL" sz="1600" dirty="0" smtClean="0">
+                <a:latin typeface="+mj-lt"/>
+              </a:rPr>
+              <a:t>_ test_).</a:t>
+            </a:r>
+          </a:p>
+        </p:txBody>
+      </p:sp>
+    </p:spTree>
+    <p:extLst>
+      <p:ext uri="{BB962C8B-B14F-4D97-AF65-F5344CB8AC3E}">
+        <p14:creationId xmlns:p14="http://schemas.microsoft.com/office/powerpoint/2010/main" val="2613403461"/>
+      </p:ext>
+    </p:extLst>
+  </p:cSld>
+  <p:clrMapOvr>
+    <a:masterClrMapping/>
+  </p:clrMapOvr>
+  <p:timing>
+    <p:tnLst>
+      <p:par>
+        <p:cTn id="1" dur="indefinite" restart="never" nodeType="tmRoot"/>
+      </p:par>
+    </p:tnLst>
+  </p:timing>
+</p:sld>
+</file>
+
+<file path=ppt/slides/slide13.xml><?xml version="1.0" encoding="utf-8"?>
+<p:sld xmlns:a="http://schemas.openxmlformats.org/drawingml/2006/main" xmlns:r="http://schemas.openxmlformats.org/officeDocument/2006/relationships" xmlns:p="http://schemas.openxmlformats.org/presentationml/2006/main">
+  <p:cSld>
+    <p:spTree>
+      <p:nvGrpSpPr>
+        <p:cNvPr id="1" name=""/>
+        <p:cNvGrpSpPr/>
+        <p:nvPr/>
+      </p:nvGrpSpPr>
+      <p:grpSpPr>
+        <a:xfrm>
+          <a:off x="0" y="0"/>
+          <a:ext cx="0" cy="0"/>
+          <a:chOff x="0" y="0"/>
+          <a:chExt cx="0" cy="0"/>
+        </a:xfrm>
+      </p:grpSpPr>
+      <p:sp>
+        <p:nvSpPr>
+          <p:cNvPr id="3" name="Symbol zastępczy zawartości 2"/>
+          <p:cNvSpPr>
+            <a:spLocks noGrp="1"/>
+          </p:cNvSpPr>
+          <p:nvPr>
+            <p:ph idx="1"/>
+          </p:nvPr>
+        </p:nvSpPr>
+        <p:spPr>
+          <a:xfrm>
+            <a:off x="457200" y="987574"/>
+            <a:ext cx="8229600" cy="3607048"/>
+          </a:xfrm>
+        </p:spPr>
+        <p:txBody>
+          <a:bodyPr>
+            <a:normAutofit/>
+          </a:bodyPr>
+          <a:lstStyle/>
+          <a:p>
+            <a:r>
+              <a:rPr lang="pl-PL" sz="1600" dirty="0" smtClean="0">
+                <a:latin typeface="+mj-lt"/>
+              </a:rPr>
+              <a:t>Stwórz szablony etykiet</a:t>
+            </a:r>
+            <a:r>
+              <a:rPr lang="pl-PL" sz="1600" dirty="0">
+                <a:latin typeface="+mj-lt"/>
+              </a:rPr>
+              <a:t/>
+            </a:r>
+            <a:br>
+              <a:rPr lang="pl-PL" sz="1600" dirty="0">
+                <a:latin typeface="+mj-lt"/>
+              </a:rPr>
+            </a:br>
+            <a:r>
+              <a:rPr lang="pl-PL" sz="1600" dirty="0" smtClean="0">
+                <a:latin typeface="+mj-lt"/>
+              </a:rPr>
+              <a:t>Etykiety spełniają swoją rolę jeszcze bardziej kiedy są tworzone </a:t>
+            </a:r>
+            <a:br>
+              <a:rPr lang="pl-PL" sz="1600" dirty="0" smtClean="0">
+                <a:latin typeface="+mj-lt"/>
+              </a:rPr>
+            </a:br>
+            <a:r>
+              <a:rPr lang="pl-PL" sz="1600" dirty="0" smtClean="0">
+                <a:latin typeface="+mj-lt"/>
+              </a:rPr>
+              <a:t>wg ustalonej spójnej konwencji.</a:t>
+            </a:r>
+          </a:p>
+          <a:p>
+            <a:r>
+              <a:rPr lang="pl-PL" sz="1600" dirty="0" smtClean="0">
+                <a:latin typeface="+mj-lt"/>
+              </a:rPr>
+              <a:t>Stwórz zakresy etykiet aby uniknąć niejednoznaczności</a:t>
+            </a:r>
+            <a:br>
+              <a:rPr lang="pl-PL" sz="1600" dirty="0" smtClean="0">
+                <a:latin typeface="+mj-lt"/>
+              </a:rPr>
+            </a:br>
+            <a:r>
+              <a:rPr lang="pl-PL" sz="1600" dirty="0" smtClean="0">
+                <a:latin typeface="+mj-lt"/>
+              </a:rPr>
+              <a:t>Aby zminimalizować niejednoznaczności i uniknąć dublowania w etykietowaniu zagadnień zawsze zastanów się nad możliwością wprowadzenia etykiet zakresu aby zautomatyzować proces nadawania etykiet i uniknąć nadawania błędnych etykiet.</a:t>
+            </a:r>
+          </a:p>
+          <a:p>
+            <a:r>
+              <a:rPr lang="pl-PL" sz="1600" dirty="0" smtClean="0">
+                <a:latin typeface="+mj-lt"/>
+              </a:rPr>
+              <a:t>Nie usuwaj raz wprowadzonych etykiet. Może to w konsekwencji usunąć zależności wprowadzone pomiędzy zagadnieniami, zadaniami, itp.</a:t>
+            </a:r>
+            <a:r>
+              <a:rPr lang="pl-PL" sz="1600" dirty="0">
+                <a:latin typeface="+mj-lt"/>
+              </a:rPr>
+              <a:t/>
+            </a:r>
+            <a:br>
+              <a:rPr lang="pl-PL" sz="1600" dirty="0">
+                <a:latin typeface="+mj-lt"/>
+              </a:rPr>
+            </a:br>
+            <a:r>
+              <a:rPr lang="pl-PL" sz="1600" dirty="0" smtClean="0">
+                <a:latin typeface="+mj-lt"/>
+              </a:rPr>
+              <a:t>Zamiast tego, jeżeli jesteś osobą powiązaną z tą etykietą (odpowiedzialną za związane z nią zagadnienie):</a:t>
+            </a:r>
+          </a:p>
+          <a:p>
+            <a:pPr lvl="1"/>
+            <a:r>
+              <a:rPr lang="pl-PL" sz="1200" dirty="0" smtClean="0">
+                <a:latin typeface="+mj-lt"/>
+              </a:rPr>
+              <a:t>Dodaj odpowiedni </a:t>
+            </a:r>
+            <a:r>
+              <a:rPr lang="pl-PL" sz="1200" dirty="0" err="1" smtClean="0">
+                <a:latin typeface="+mj-lt"/>
+              </a:rPr>
+              <a:t>tag</a:t>
+            </a:r>
+            <a:r>
+              <a:rPr lang="pl-PL" sz="1200" dirty="0" smtClean="0">
+                <a:latin typeface="+mj-lt"/>
+              </a:rPr>
+              <a:t> do etykiety, np. usuwana_ (</a:t>
+            </a:r>
+            <a:r>
+              <a:rPr lang="pl-PL" sz="1200" i="1" dirty="0" smtClean="0">
+                <a:latin typeface="+mj-lt"/>
+              </a:rPr>
+              <a:t>etykieta</a:t>
+            </a:r>
+            <a:r>
+              <a:rPr lang="pl-PL" sz="1200" dirty="0" smtClean="0">
+                <a:latin typeface="+mj-lt"/>
+              </a:rPr>
+              <a:t> zmieni się na </a:t>
+            </a:r>
+            <a:r>
+              <a:rPr lang="pl-PL" sz="1200" i="1" dirty="0" err="1" smtClean="0">
+                <a:latin typeface="+mj-lt"/>
+              </a:rPr>
+              <a:t>usuwana_etykieta</a:t>
+            </a:r>
+            <a:r>
+              <a:rPr lang="pl-PL" sz="1200" dirty="0" smtClean="0">
+                <a:latin typeface="+mj-lt"/>
+              </a:rPr>
+              <a:t>)</a:t>
+            </a:r>
+          </a:p>
+          <a:p>
+            <a:pPr lvl="1"/>
+            <a:r>
+              <a:rPr lang="pl-PL" sz="1200" dirty="0" smtClean="0">
+                <a:latin typeface="+mj-lt"/>
+              </a:rPr>
+              <a:t>Zakomunikują to zespołowi</a:t>
+            </a:r>
+          </a:p>
+          <a:p>
+            <a:pPr lvl="1"/>
+            <a:r>
+              <a:rPr lang="pl-PL" sz="1200" dirty="0" smtClean="0">
+                <a:latin typeface="+mj-lt"/>
+              </a:rPr>
+              <a:t>Zaczekaj miesiąc kalendarzowy zanim usuniesz etykietę</a:t>
+            </a:r>
+          </a:p>
+        </p:txBody>
+      </p:sp>
+    </p:spTree>
+    <p:extLst>
+      <p:ext uri="{BB962C8B-B14F-4D97-AF65-F5344CB8AC3E}">
+        <p14:creationId xmlns:p14="http://schemas.microsoft.com/office/powerpoint/2010/main" val="2613403461"/>
+      </p:ext>
+    </p:extLst>
+  </p:cSld>
+  <p:clrMapOvr>
+    <a:masterClrMapping/>
+  </p:clrMapOvr>
+  <p:timing>
+    <p:tnLst>
+      <p:par>
+        <p:cTn id="1" dur="indefinite" restart="never" nodeType="tmRoot"/>
+      </p:par>
+    </p:tnLst>
+  </p:timing>
+</p:sld>
+</file>
+
 <file path=ppt/slides/slide2.xml><?xml version="1.0" encoding="utf-8"?>
 <p:sld xmlns:a="http://schemas.openxmlformats.org/drawingml/2006/main" xmlns:r="http://schemas.openxmlformats.org/officeDocument/2006/relationships" xmlns:p="http://schemas.openxmlformats.org/presentationml/2006/main">
   <p:cSld>
@@ -3949,7 +4711,7 @@
         </p:spPr>
         <p:txBody>
           <a:bodyPr>
-            <a:normAutofit/>
+            <a:normAutofit lnSpcReduction="10000"/>
           </a:bodyPr>
           <a:lstStyle/>
           <a:p>
@@ -3957,66 +4719,68 @@
               <a:buNone/>
             </a:pPr>
             <a:r>
-              <a:rPr lang="pl-PL" sz="1600" b="1" dirty="0" smtClean="0"/>
-              <a:t>Etykiety projektu</a:t>
-            </a:r>
-          </a:p>
-          <a:p>
-            <a:r>
-              <a:rPr lang="pl-PL" sz="1600" dirty="0" smtClean="0"/>
-              <a:t>Dostępne </a:t>
-            </a:r>
-            <a:r>
-              <a:rPr lang="pl-PL" sz="1600" dirty="0"/>
-              <a:t>są pod zakładką </a:t>
-            </a:r>
-            <a:r>
-              <a:rPr lang="pl-PL" sz="1600" b="1" dirty="0" smtClean="0"/>
-              <a:t>Issues/Labels</a:t>
-            </a:r>
-            <a:r>
-              <a:rPr lang="pl-PL" sz="1600" dirty="0" smtClean="0"/>
-              <a:t> </a:t>
-            </a:r>
-            <a:endParaRPr lang="pl-PL" sz="1600" dirty="0"/>
-          </a:p>
-          <a:p>
-            <a:r>
-              <a:rPr lang="pl-PL" sz="1600" dirty="0" smtClean="0"/>
-              <a:t>Przedstawiają </a:t>
-            </a:r>
-            <a:r>
-              <a:rPr lang="pl-PL" sz="1600" dirty="0"/>
-              <a:t>zarówno etykiety zdefiniowane na poziomie projektu jak i etykiety zdefiniowane na poziomie członków grupy.</a:t>
-            </a:r>
-          </a:p>
-          <a:p>
-            <a:r>
-              <a:rPr lang="pl-PL" sz="1600" dirty="0"/>
-              <a:t>Dla </a:t>
-            </a:r>
-            <a:r>
-              <a:rPr lang="pl-PL" sz="1600" dirty="0" smtClean="0"/>
-              <a:t>każdej etykiety widoczne </a:t>
-            </a:r>
-            <a:r>
-              <a:rPr lang="pl-PL" sz="1600" dirty="0"/>
-              <a:t>jest odniesienie do </a:t>
-            </a:r>
-            <a:r>
-              <a:rPr lang="pl-PL" sz="1600" dirty="0" smtClean="0"/>
-              <a:t>projektu </a:t>
-            </a:r>
-            <a:r>
-              <a:rPr lang="pl-PL" sz="1600" dirty="0"/>
-              <a:t>lub grupy projektów dla których została utworzona lub z którymi jest związana.</a:t>
-            </a:r>
+              <a:rPr lang="pl-PL" sz="2400" b="1" dirty="0" smtClean="0">
+                <a:latin typeface="+mj-lt"/>
+              </a:rPr>
+              <a:t>Labels </a:t>
+            </a:r>
+            <a:endParaRPr lang="pl-PL" sz="1600" b="1" dirty="0" smtClean="0">
+              <a:latin typeface="+mj-lt"/>
+            </a:endParaRPr>
+          </a:p>
+          <a:p>
+            <a:r>
+              <a:rPr lang="pl-PL" sz="1600" dirty="0" smtClean="0">
+                <a:latin typeface="+mj-lt"/>
+              </a:rPr>
+              <a:t>Są drogą do elastycznego kategoryzowania zagadnień, zgłoszeń i żądań.</a:t>
+            </a:r>
+          </a:p>
+          <a:p>
+            <a:r>
+              <a:rPr lang="pl-PL" sz="1600" dirty="0" smtClean="0">
+                <a:latin typeface="+mj-lt"/>
+              </a:rPr>
+              <a:t>Konsekwentna i właściwa implementacja zapewnia użytkownikom możliwość analizy, zarządzania i raportowania</a:t>
+            </a:r>
+          </a:p>
+          <a:p>
+            <a:r>
+              <a:rPr lang="pl-PL" sz="1600" dirty="0" smtClean="0">
+                <a:latin typeface="+mj-lt"/>
+              </a:rPr>
+              <a:t>Domyślnie etykiety nie są wzajemnie wykluczające. Poszczególne problemy, zagadnienia i zatwierdzenia mogą być etykietowane wielokrotnie, wielorako i przez różnych autorów.</a:t>
+            </a:r>
+          </a:p>
+          <a:p>
+            <a:r>
+              <a:rPr lang="pl-PL" sz="1600" dirty="0" smtClean="0">
+                <a:latin typeface="+mj-lt"/>
+              </a:rPr>
+              <a:t>Wyjątkiem od tej reguły są etykiety zakresu, które określają zestawy wzajemnie wykluczających się lub duplikowanych etykiet. Kiedy wprowadzona zostaje etykieta zakresu, przesłania ona wcześniej ustaloną dla danego elementu etykietę szczegółową.</a:t>
+            </a:r>
+          </a:p>
+          <a:p>
+            <a:r>
+              <a:rPr lang="pl-PL" sz="1600" dirty="0" smtClean="0">
+                <a:latin typeface="+mj-lt"/>
+              </a:rPr>
+              <a:t>Etykiety zakresu wykorzystuje się do oznaczania etapów, statusów lub innych aspektów w przypadkach szczególnych.</a:t>
+            </a:r>
+            <a:endParaRPr lang="pl-PL" sz="1600" dirty="0" smtClean="0">
+              <a:latin typeface="+mj-lt"/>
+            </a:endParaRPr>
+          </a:p>
+          <a:p>
+            <a:endParaRPr lang="pl-PL" sz="1600" dirty="0" smtClean="0">
+              <a:latin typeface="+mj-lt"/>
+            </a:endParaRPr>
           </a:p>
           <a:p>
             <a:pPr marL="0" indent="0">
               <a:buNone/>
             </a:pPr>
-            <a:endParaRPr lang="pl-PL" sz="1100" dirty="0" smtClean="0">
+            <a:endParaRPr lang="pl-PL" sz="1600" dirty="0" smtClean="0">
               <a:latin typeface="+mj-lt"/>
             </a:endParaRPr>
           </a:p>
@@ -4025,7 +4789,7 @@
     </p:spTree>
     <p:extLst>
       <p:ext uri="{BB962C8B-B14F-4D97-AF65-F5344CB8AC3E}">
-        <p14:creationId xmlns:p14="http://schemas.microsoft.com/office/powerpoint/2010/main" val="3367801278"/>
+        <p14:creationId xmlns:p14="http://schemas.microsoft.com/office/powerpoint/2010/main" val="1229092727"/>
       </p:ext>
     </p:extLst>
   </p:cSld>
@@ -4085,128 +4849,83 @@
               <a:buNone/>
             </a:pPr>
             <a:r>
-              <a:rPr lang="pl-PL" sz="1600" b="1" dirty="0" smtClean="0"/>
-              <a:t>Etykiety grup</a:t>
-            </a:r>
-          </a:p>
-          <a:p>
-            <a:r>
-              <a:rPr lang="pl-PL" sz="1600" dirty="0" smtClean="0"/>
-              <a:t>Dostępne </a:t>
-            </a:r>
-            <a:r>
-              <a:rPr lang="pl-PL" sz="1600" dirty="0"/>
-              <a:t>są </a:t>
-            </a:r>
-            <a:r>
-              <a:rPr lang="pl-PL" sz="1600" dirty="0" smtClean="0"/>
-              <a:t>zakładce </a:t>
-            </a:r>
-            <a:r>
-              <a:rPr lang="pl-PL" sz="1600" b="1" dirty="0" err="1" smtClean="0"/>
-              <a:t>Issues</a:t>
-            </a:r>
-            <a:r>
-              <a:rPr lang="pl-PL" sz="1600" b="1" dirty="0" smtClean="0"/>
-              <a:t>/</a:t>
-            </a:r>
-            <a:r>
-              <a:rPr lang="pl-PL" sz="1600" b="1" dirty="0" err="1" smtClean="0"/>
-              <a:t>Labels</a:t>
-            </a:r>
-            <a:endParaRPr lang="pl-PL" sz="1600" b="1" dirty="0" smtClean="0"/>
-          </a:p>
-          <a:p>
-            <a:r>
-              <a:rPr lang="pl-PL" sz="1600" dirty="0" smtClean="0"/>
-              <a:t>Wyświetlone są tam </a:t>
-            </a:r>
-            <a:r>
-              <a:rPr lang="pl-PL" sz="1600" dirty="0" smtClean="0"/>
-              <a:t>wyłącznie </a:t>
-            </a:r>
-            <a:r>
-              <a:rPr lang="pl-PL" sz="1600" dirty="0"/>
-              <a:t>te </a:t>
-            </a:r>
-            <a:r>
-              <a:rPr lang="pl-PL" sz="1600" dirty="0" smtClean="0"/>
-              <a:t>zakładki, które </a:t>
-            </a:r>
-            <a:r>
-              <a:rPr lang="pl-PL" sz="1600" dirty="0"/>
-              <a:t>zdefiniowane zostały na poziomie grupy</a:t>
-            </a:r>
-            <a:r>
-              <a:rPr lang="pl-PL" sz="1600" dirty="0" smtClean="0"/>
-              <a:t>.</a:t>
-            </a:r>
-            <a:endParaRPr lang="pl-PL" sz="1600" dirty="0" smtClean="0"/>
-          </a:p>
-          <a:p>
-            <a:r>
-              <a:rPr lang="pl-PL" sz="1600" dirty="0" smtClean="0"/>
-              <a:t>Nie </a:t>
-            </a:r>
-            <a:r>
-              <a:rPr lang="pl-PL" sz="1600" dirty="0"/>
-              <a:t>są </a:t>
-            </a:r>
-            <a:r>
-              <a:rPr lang="pl-PL" sz="1600" dirty="0" smtClean="0"/>
-              <a:t>tu </a:t>
-            </a:r>
-            <a:r>
-              <a:rPr lang="pl-PL" sz="1600" dirty="0"/>
-              <a:t>wyświetlane etykiety przypisane dla konkretnych projektów. </a:t>
-            </a:r>
-            <a:endParaRPr lang="pl-PL" sz="1600" dirty="0" smtClean="0"/>
-          </a:p>
-          <a:p>
-            <a:r>
-              <a:rPr lang="pl-PL" sz="1600" dirty="0" smtClean="0"/>
-              <a:t>Poprzez </a:t>
-            </a:r>
-            <a:r>
-              <a:rPr lang="pl-PL" sz="1600" dirty="0"/>
-              <a:t>pole </a:t>
-            </a:r>
-            <a:r>
-              <a:rPr lang="pl-PL" sz="1600" dirty="0" smtClean="0"/>
-              <a:t>wyszukiwania można </a:t>
-            </a:r>
-            <a:r>
-              <a:rPr lang="pl-PL" sz="1600" dirty="0"/>
-              <a:t>filtrować listę </a:t>
-            </a:r>
-            <a:r>
-              <a:rPr lang="pl-PL" sz="1600" dirty="0" smtClean="0"/>
-              <a:t>zadań</a:t>
-            </a:r>
-            <a:r>
-              <a:rPr lang="pl-PL" sz="1600" dirty="0"/>
-              <a:t> </a:t>
-            </a:r>
-            <a:r>
-              <a:rPr lang="pl-PL" sz="1600" dirty="0" smtClean="0"/>
-              <a:t>i zagadnień.</a:t>
-            </a:r>
-            <a:endParaRPr lang="pl-PL" sz="1600" dirty="0"/>
-          </a:p>
-          <a:p>
-            <a:pPr marL="0" indent="0">
-              <a:buNone/>
-            </a:pPr>
-            <a:endParaRPr lang="pl-PL" sz="1600" dirty="0" smtClean="0">
+              <a:rPr lang="pl-PL" sz="2400" b="1" dirty="0" smtClean="0">
+                <a:latin typeface="+mj-lt"/>
+              </a:rPr>
+              <a:t>Labels </a:t>
+            </a:r>
+            <a:endParaRPr lang="pl-PL" sz="2400" b="1" dirty="0" smtClean="0">
               <a:latin typeface="+mj-lt"/>
             </a:endParaRPr>
           </a:p>
-        </p:txBody>
-      </p:sp>
+          <a:p>
+            <a:pPr marL="0" indent="0">
+              <a:buNone/>
+            </a:pPr>
+            <a:endParaRPr lang="pl-PL" sz="1600" b="1" dirty="0" smtClean="0">
+              <a:latin typeface="+mj-lt"/>
+            </a:endParaRPr>
+          </a:p>
+        </p:txBody>
+      </p:sp>
+      <p:pic>
+        <p:nvPicPr>
+          <p:cNvPr id="1026" name="Picture 2"/>
+          <p:cNvPicPr>
+            <a:picLocks noChangeAspect="1" noChangeArrowheads="1"/>
+          </p:cNvPicPr>
+          <p:nvPr/>
+        </p:nvPicPr>
+        <p:blipFill>
+          <a:blip r:embed="rId2">
+            <a:extLst>
+              <a:ext uri="{28A0092B-C50C-407E-A947-70E740481C1C}">
+                <a14:useLocalDpi xmlns:a14="http://schemas.microsoft.com/office/drawing/2010/main" val="0"/>
+              </a:ext>
+            </a:extLst>
+          </a:blip>
+          <a:srcRect/>
+          <a:stretch>
+            <a:fillRect/>
+          </a:stretch>
+        </p:blipFill>
+        <p:spPr bwMode="auto">
+          <a:xfrm>
+            <a:off x="899592" y="1851670"/>
+            <a:ext cx="7310524" cy="864096"/>
+          </a:xfrm>
+          <a:prstGeom prst="rect">
+            <a:avLst/>
+          </a:prstGeom>
+          <a:noFill/>
+          <a:ln>
+            <a:noFill/>
+          </a:ln>
+          <a:extLst>
+            <a:ext uri="{909E8E84-426E-40DD-AFC4-6F175D3DCCD1}">
+              <a14:hiddenFill xmlns:a14="http://schemas.microsoft.com/office/drawing/2010/main">
+                <a:solidFill>
+                  <a:schemeClr val="accent1"/>
+                </a:solidFill>
+              </a14:hiddenFill>
+            </a:ext>
+            <a:ext uri="{91240B29-F687-4F45-9708-019B960494DF}">
+              <a14:hiddenLine xmlns:a14="http://schemas.microsoft.com/office/drawing/2010/main" w="9525">
+                <a:solidFill>
+                  <a:schemeClr val="tx1"/>
+                </a:solidFill>
+                <a:miter lim="800000"/>
+                <a:headEnd/>
+                <a:tailEnd/>
+              </a14:hiddenLine>
+            </a:ext>
+          </a:extLst>
+        </p:spPr>
+      </p:pic>
     </p:spTree>
     <p:extLst>
       <p:ext uri="{BB962C8B-B14F-4D97-AF65-F5344CB8AC3E}">
-        <p14:creationId xmlns:p14="http://schemas.microsoft.com/office/powerpoint/2010/main" val="263543437"/>
+        <p14:creationId xmlns:p14="http://schemas.microsoft.com/office/powerpoint/2010/main" val="546172483"/>
       </p:ext>
     </p:extLst>
   </p:cSld>
@@ -4267,61 +4986,65 @@
             </a:pPr>
             <a:r>
               <a:rPr lang="pl-PL" sz="1600" b="1" dirty="0" smtClean="0"/>
-              <a:t>Przestrzenie etykiet (</a:t>
-            </a:r>
-            <a:r>
-              <a:rPr lang="pl-PL" sz="1600" b="1" dirty="0" err="1" smtClean="0"/>
-              <a:t>Scoped</a:t>
+              <a:t>Etykiety projektu</a:t>
+            </a:r>
+          </a:p>
+          <a:p>
+            <a:r>
+              <a:rPr lang="pl-PL" sz="1600" dirty="0" smtClean="0"/>
+              <a:t>Dostępne </a:t>
+            </a:r>
+            <a:r>
+              <a:rPr lang="pl-PL" sz="1600" dirty="0"/>
+              <a:t>są pod zakładką </a:t>
             </a:r>
             <a:r>
               <a:rPr lang="pl-PL" sz="1600" b="1" dirty="0" smtClean="0"/>
-              <a:t> Labels)</a:t>
-            </a:r>
-            <a:endParaRPr lang="pl-PL" sz="1600" b="1" dirty="0" smtClean="0"/>
-          </a:p>
-          <a:p>
+              <a:t>Issues/Labels</a:t>
+            </a:r>
             <a:r>
               <a:rPr lang="pl-PL" sz="1600" dirty="0" smtClean="0"/>
-              <a:t>Przestrzeń etykiet definiowana jest poprzez wykorzystanie podwójnego</a:t>
-            </a:r>
-            <a:br>
+              <a:t> </a:t>
+            </a:r>
+            <a:endParaRPr lang="pl-PL" sz="1600" dirty="0"/>
+          </a:p>
+          <a:p>
+            <a:r>
               <a:rPr lang="pl-PL" sz="1600" dirty="0" smtClean="0"/>
-            </a:br>
+              <a:t>Przedstawiają </a:t>
+            </a:r>
+            <a:r>
+              <a:rPr lang="pl-PL" sz="1600" dirty="0"/>
+              <a:t>zarówno etykiety zdefiniowane na poziomie projektu jak i etykiety zdefiniowane na poziomie członków grupy.</a:t>
+            </a:r>
+          </a:p>
+          <a:p>
+            <a:r>
+              <a:rPr lang="pl-PL" sz="1600" dirty="0"/>
+              <a:t>Dla </a:t>
+            </a:r>
             <a:r>
               <a:rPr lang="pl-PL" sz="1600" dirty="0" smtClean="0"/>
-              <a:t>dwukropka „</a:t>
-            </a:r>
-            <a:r>
-              <a:rPr lang="pl-PL" sz="1600" b="1" dirty="0" smtClean="0"/>
-              <a:t>::</a:t>
+              <a:t>każdej etykiety widoczne </a:t>
+            </a:r>
+            <a:r>
+              <a:rPr lang="pl-PL" sz="1600" dirty="0"/>
+              <a:t>jest odniesienie do </a:t>
             </a:r>
             <a:r>
               <a:rPr lang="pl-PL" sz="1600" dirty="0" smtClean="0"/>
-              <a:t>”</a:t>
-            </a:r>
-          </a:p>
-          <a:p>
-            <a:r>
-              <a:rPr lang="pl-PL" sz="1600" dirty="0" smtClean="0"/>
-              <a:t>Przestrzenie etykiet można zagnieżdżać, tworząc bardziej złożone struktury np. </a:t>
-            </a:r>
-            <a:r>
-              <a:rPr lang="pl-PL" sz="1600" b="1" dirty="0" err="1" smtClean="0"/>
-              <a:t>DevOps</a:t>
-            </a:r>
-            <a:r>
-              <a:rPr lang="pl-PL" sz="1600" b="1" dirty="0" smtClean="0"/>
-              <a:t>::Development::Test</a:t>
-            </a:r>
-          </a:p>
-          <a:p>
-            <a:endParaRPr lang="pl-PL" sz="1600" b="1" dirty="0" smtClean="0"/>
+              <a:t>projektu </a:t>
+            </a:r>
+            <a:r>
+              <a:rPr lang="pl-PL" sz="1600" dirty="0"/>
+              <a:t>lub grupy projektów dla których została utworzona lub z którymi jest związana.</a:t>
+            </a:r>
           </a:p>
           <a:p>
             <a:pPr marL="0" indent="0">
               <a:buNone/>
             </a:pPr>
-            <a:endParaRPr lang="pl-PL" sz="1600" dirty="0" smtClean="0">
+            <a:endParaRPr lang="pl-PL" sz="1100" dirty="0" smtClean="0">
               <a:latin typeface="+mj-lt"/>
             </a:endParaRPr>
           </a:p>
@@ -4330,7 +5053,7 @@
     </p:spTree>
     <p:extLst>
       <p:ext uri="{BB962C8B-B14F-4D97-AF65-F5344CB8AC3E}">
-        <p14:creationId xmlns:p14="http://schemas.microsoft.com/office/powerpoint/2010/main" val="1558619721"/>
+        <p14:creationId xmlns:p14="http://schemas.microsoft.com/office/powerpoint/2010/main" val="3367801278"/>
       </p:ext>
     </p:extLst>
   </p:cSld>
@@ -4382,13 +5105,318 @@
         </p:spPr>
         <p:txBody>
           <a:bodyPr>
+            <a:normAutofit/>
+          </a:bodyPr>
+          <a:lstStyle/>
+          <a:p>
+            <a:pPr marL="0" indent="0">
+              <a:buNone/>
+            </a:pPr>
+            <a:r>
+              <a:rPr lang="pl-PL" sz="1600" b="1" dirty="0" smtClean="0"/>
+              <a:t>Etykiety grup</a:t>
+            </a:r>
+          </a:p>
+          <a:p>
+            <a:r>
+              <a:rPr lang="pl-PL" sz="1600" dirty="0" smtClean="0"/>
+              <a:t>Dostępne </a:t>
+            </a:r>
+            <a:r>
+              <a:rPr lang="pl-PL" sz="1600" dirty="0"/>
+              <a:t>są </a:t>
+            </a:r>
+            <a:r>
+              <a:rPr lang="pl-PL" sz="1600" dirty="0" smtClean="0"/>
+              <a:t>zakładce </a:t>
+            </a:r>
+            <a:r>
+              <a:rPr lang="pl-PL" sz="1600" b="1" dirty="0" err="1" smtClean="0"/>
+              <a:t>Issues</a:t>
+            </a:r>
+            <a:r>
+              <a:rPr lang="pl-PL" sz="1600" b="1" dirty="0" smtClean="0"/>
+              <a:t>/</a:t>
+            </a:r>
+            <a:r>
+              <a:rPr lang="pl-PL" sz="1600" b="1" dirty="0" err="1" smtClean="0"/>
+              <a:t>Labels</a:t>
+            </a:r>
+            <a:endParaRPr lang="pl-PL" sz="1600" b="1" dirty="0" smtClean="0"/>
+          </a:p>
+          <a:p>
+            <a:r>
+              <a:rPr lang="pl-PL" sz="1600" dirty="0" smtClean="0"/>
+              <a:t>Wyświetlone są tam wyłącznie </a:t>
+            </a:r>
+            <a:r>
+              <a:rPr lang="pl-PL" sz="1600" dirty="0"/>
+              <a:t>te </a:t>
+            </a:r>
+            <a:r>
+              <a:rPr lang="pl-PL" sz="1600" dirty="0" smtClean="0"/>
+              <a:t>zakładki, które </a:t>
+            </a:r>
+            <a:r>
+              <a:rPr lang="pl-PL" sz="1600" dirty="0"/>
+              <a:t>zdefiniowane zostały na poziomie grupy</a:t>
+            </a:r>
+            <a:r>
+              <a:rPr lang="pl-PL" sz="1600" dirty="0" smtClean="0"/>
+              <a:t>.</a:t>
+            </a:r>
+          </a:p>
+          <a:p>
+            <a:r>
+              <a:rPr lang="pl-PL" sz="1600" dirty="0" smtClean="0"/>
+              <a:t>Nie </a:t>
+            </a:r>
+            <a:r>
+              <a:rPr lang="pl-PL" sz="1600" dirty="0"/>
+              <a:t>są </a:t>
+            </a:r>
+            <a:r>
+              <a:rPr lang="pl-PL" sz="1600" dirty="0" smtClean="0"/>
+              <a:t>tu </a:t>
+            </a:r>
+            <a:r>
+              <a:rPr lang="pl-PL" sz="1600" dirty="0"/>
+              <a:t>wyświetlane etykiety przypisane dla konkretnych projektów. </a:t>
+            </a:r>
+            <a:endParaRPr lang="pl-PL" sz="1600" dirty="0" smtClean="0"/>
+          </a:p>
+          <a:p>
+            <a:r>
+              <a:rPr lang="pl-PL" sz="1600" dirty="0" smtClean="0"/>
+              <a:t>Poprzez </a:t>
+            </a:r>
+            <a:r>
+              <a:rPr lang="pl-PL" sz="1600" dirty="0"/>
+              <a:t>pole </a:t>
+            </a:r>
+            <a:r>
+              <a:rPr lang="pl-PL" sz="1600" dirty="0" smtClean="0"/>
+              <a:t>wyszukiwania można </a:t>
+            </a:r>
+            <a:r>
+              <a:rPr lang="pl-PL" sz="1600" dirty="0"/>
+              <a:t>filtrować listę </a:t>
+            </a:r>
+            <a:r>
+              <a:rPr lang="pl-PL" sz="1600" dirty="0" smtClean="0"/>
+              <a:t>zadań</a:t>
+            </a:r>
+            <a:r>
+              <a:rPr lang="pl-PL" sz="1600" dirty="0"/>
+              <a:t> </a:t>
+            </a:r>
+            <a:r>
+              <a:rPr lang="pl-PL" sz="1600" dirty="0" smtClean="0"/>
+              <a:t>i zagadnień.</a:t>
+            </a:r>
+            <a:endParaRPr lang="pl-PL" sz="1600" dirty="0"/>
+          </a:p>
+          <a:p>
+            <a:pPr marL="0" indent="0">
+              <a:buNone/>
+            </a:pPr>
+            <a:endParaRPr lang="pl-PL" sz="1600" dirty="0" smtClean="0">
+              <a:latin typeface="+mj-lt"/>
+            </a:endParaRPr>
+          </a:p>
+        </p:txBody>
+      </p:sp>
+    </p:spTree>
+    <p:extLst>
+      <p:ext uri="{BB962C8B-B14F-4D97-AF65-F5344CB8AC3E}">
+        <p14:creationId xmlns:p14="http://schemas.microsoft.com/office/powerpoint/2010/main" val="263543437"/>
+      </p:ext>
+    </p:extLst>
+  </p:cSld>
+  <p:clrMapOvr>
+    <a:masterClrMapping/>
+  </p:clrMapOvr>
+  <p:timing>
+    <p:tnLst>
+      <p:par>
+        <p:cTn id="1" dur="indefinite" restart="never" nodeType="tmRoot"/>
+      </p:par>
+    </p:tnLst>
+  </p:timing>
+</p:sld>
+</file>
+
+<file path=ppt/slides/slide8.xml><?xml version="1.0" encoding="utf-8"?>
+<p:sld xmlns:a="http://schemas.openxmlformats.org/drawingml/2006/main" xmlns:r="http://schemas.openxmlformats.org/officeDocument/2006/relationships" xmlns:p="http://schemas.openxmlformats.org/presentationml/2006/main">
+  <p:cSld>
+    <p:spTree>
+      <p:nvGrpSpPr>
+        <p:cNvPr id="1" name=""/>
+        <p:cNvGrpSpPr/>
+        <p:nvPr/>
+      </p:nvGrpSpPr>
+      <p:grpSpPr>
+        <a:xfrm>
+          <a:off x="0" y="0"/>
+          <a:ext cx="0" cy="0"/>
+          <a:chOff x="0" y="0"/>
+          <a:chExt cx="0" cy="0"/>
+        </a:xfrm>
+      </p:grpSpPr>
+      <p:sp>
+        <p:nvSpPr>
+          <p:cNvPr id="3" name="Symbol zastępczy zawartości 2"/>
+          <p:cNvSpPr>
+            <a:spLocks noGrp="1"/>
+          </p:cNvSpPr>
+          <p:nvPr>
+            <p:ph idx="1"/>
+          </p:nvPr>
+        </p:nvSpPr>
+        <p:spPr>
+          <a:xfrm>
+            <a:off x="457200" y="987574"/>
+            <a:ext cx="8229600" cy="3607048"/>
+          </a:xfrm>
+        </p:spPr>
+        <p:txBody>
+          <a:bodyPr>
+            <a:normAutofit/>
+          </a:bodyPr>
+          <a:lstStyle/>
+          <a:p>
+            <a:pPr marL="0" indent="0">
+              <a:buNone/>
+            </a:pPr>
+            <a:r>
+              <a:rPr lang="pl-PL" sz="1600" b="1" dirty="0" smtClean="0"/>
+              <a:t>Przestrzenie etykiet (</a:t>
+            </a:r>
+            <a:r>
+              <a:rPr lang="pl-PL" sz="1600" b="1" dirty="0" err="1" smtClean="0"/>
+              <a:t>Scoped</a:t>
+            </a:r>
+            <a:r>
+              <a:rPr lang="pl-PL" sz="1600" b="1" dirty="0" smtClean="0"/>
+              <a:t> Labels)</a:t>
+            </a:r>
+          </a:p>
+          <a:p>
+            <a:r>
+              <a:rPr lang="pl-PL" sz="1600" dirty="0" smtClean="0"/>
+              <a:t>Przestrzeń etykiet </a:t>
+            </a:r>
+            <a:r>
+              <a:rPr lang="pl-PL" sz="1600" dirty="0" smtClean="0"/>
+              <a:t>(dla etykiet zakresu) definiowana </a:t>
+            </a:r>
+            <a:r>
+              <a:rPr lang="pl-PL" sz="1600" dirty="0" smtClean="0"/>
+              <a:t>jest poprzez wykorzystanie </a:t>
+            </a:r>
+            <a:r>
+              <a:rPr lang="pl-PL" sz="1600" dirty="0" smtClean="0"/>
+              <a:t>podwójnego dwukropka </a:t>
+            </a:r>
+            <a:r>
+              <a:rPr lang="pl-PL" sz="1600" dirty="0" smtClean="0"/>
+              <a:t>„</a:t>
+            </a:r>
+            <a:r>
+              <a:rPr lang="pl-PL" sz="1600" b="1" dirty="0" smtClean="0"/>
+              <a:t>::</a:t>
+            </a:r>
+            <a:r>
+              <a:rPr lang="pl-PL" sz="1600" dirty="0" smtClean="0"/>
+              <a:t>”</a:t>
+            </a:r>
+          </a:p>
+          <a:p>
+            <a:r>
+              <a:rPr lang="pl-PL" sz="1600" dirty="0" smtClean="0"/>
+              <a:t>Przestrzenie etykiet można zagnieżdżać, tworząc bardziej złożone struktury np. </a:t>
+            </a:r>
+            <a:r>
+              <a:rPr lang="pl-PL" sz="1600" b="1" dirty="0" err="1" smtClean="0"/>
+              <a:t>DevOps</a:t>
+            </a:r>
+            <a:r>
+              <a:rPr lang="pl-PL" sz="1600" b="1" dirty="0" smtClean="0"/>
+              <a:t>::Development::Test</a:t>
+            </a:r>
+          </a:p>
+          <a:p>
+            <a:endParaRPr lang="pl-PL" sz="1600" b="1" dirty="0" smtClean="0"/>
+          </a:p>
+          <a:p>
+            <a:pPr marL="0" indent="0">
+              <a:buNone/>
+            </a:pPr>
+            <a:endParaRPr lang="pl-PL" sz="1600" dirty="0" smtClean="0">
+              <a:latin typeface="+mj-lt"/>
+            </a:endParaRPr>
+          </a:p>
+        </p:txBody>
+      </p:sp>
+    </p:spTree>
+    <p:extLst>
+      <p:ext uri="{BB962C8B-B14F-4D97-AF65-F5344CB8AC3E}">
+        <p14:creationId xmlns:p14="http://schemas.microsoft.com/office/powerpoint/2010/main" val="1558619721"/>
+      </p:ext>
+    </p:extLst>
+  </p:cSld>
+  <p:clrMapOvr>
+    <a:masterClrMapping/>
+  </p:clrMapOvr>
+  <p:timing>
+    <p:tnLst>
+      <p:par>
+        <p:cTn id="1" dur="indefinite" restart="never" nodeType="tmRoot"/>
+      </p:par>
+    </p:tnLst>
+  </p:timing>
+</p:sld>
+</file>
+
+<file path=ppt/slides/slide9.xml><?xml version="1.0" encoding="utf-8"?>
+<p:sld xmlns:a="http://schemas.openxmlformats.org/drawingml/2006/main" xmlns:r="http://schemas.openxmlformats.org/officeDocument/2006/relationships" xmlns:p="http://schemas.openxmlformats.org/presentationml/2006/main">
+  <p:cSld>
+    <p:spTree>
+      <p:nvGrpSpPr>
+        <p:cNvPr id="1" name=""/>
+        <p:cNvGrpSpPr/>
+        <p:nvPr/>
+      </p:nvGrpSpPr>
+      <p:grpSpPr>
+        <a:xfrm>
+          <a:off x="0" y="0"/>
+          <a:ext cx="0" cy="0"/>
+          <a:chOff x="0" y="0"/>
+          <a:chExt cx="0" cy="0"/>
+        </a:xfrm>
+      </p:grpSpPr>
+      <p:sp>
+        <p:nvSpPr>
+          <p:cNvPr id="3" name="Symbol zastępczy zawartości 2"/>
+          <p:cNvSpPr>
+            <a:spLocks noGrp="1"/>
+          </p:cNvSpPr>
+          <p:nvPr>
+            <p:ph idx="1"/>
+          </p:nvPr>
+        </p:nvSpPr>
+        <p:spPr>
+          <a:xfrm>
+            <a:off x="457200" y="987574"/>
+            <a:ext cx="8229600" cy="3607048"/>
+          </a:xfrm>
+        </p:spPr>
+        <p:txBody>
+          <a:bodyPr>
             <a:normAutofit fontScale="55000" lnSpcReduction="20000"/>
           </a:bodyPr>
           <a:lstStyle/>
           <a:p>
-            <a:pPr marL="0" indent="0">
-              <a:buNone/>
-            </a:pPr>
             <a:r>
               <a:rPr lang="pl-PL" sz="2900" dirty="0"/>
               <a:t>Etykiety pozwalają wyszczególniać </a:t>
@@ -4401,19 +5429,20 @@
               <a:rPr lang="pl-PL" sz="2900" dirty="0"/>
               <a:t>grupy tematyczne </a:t>
             </a:r>
-            <a:endParaRPr lang="pl-PL" sz="2900" dirty="0" smtClean="0"/>
-          </a:p>
-          <a:p>
-            <a:pPr marL="0" indent="0">
-              <a:buNone/>
-            </a:pPr>
+            <a:r>
+              <a:rPr lang="pl-PL" sz="2900" dirty="0"/>
+              <a:t/>
+            </a:r>
+            <a:br>
+              <a:rPr lang="pl-PL" sz="2900" dirty="0"/>
+            </a:br>
             <a:r>
               <a:rPr lang="pl-PL" sz="2900" dirty="0" smtClean="0"/>
-              <a:t>systemu zadań </a:t>
+              <a:t>systemu </a:t>
             </a:r>
             <a:r>
               <a:rPr lang="pl-PL" sz="2900" dirty="0" smtClean="0"/>
-              <a:t>GitLab (tablicy zgłoszeń </a:t>
+              <a:t>zadań GitLab (tablicy zgłoszeń </a:t>
             </a:r>
             <a:r>
               <a:rPr lang="pl-PL" sz="2900" b="1" dirty="0" smtClean="0"/>
@@ -4421,30 +5450,22 @@
             </a:r>
             <a:r>
               <a:rPr lang="pl-PL" sz="2900" dirty="0" smtClean="0"/>
-              <a:t>), </a:t>
-            </a:r>
-            <a:r>
-              <a:rPr lang="pl-PL" sz="2900" dirty="0" smtClean="0"/>
-              <a:t>stając </a:t>
+              <a:t>), stając </a:t>
             </a:r>
             <a:r>
               <a:rPr lang="pl-PL" sz="2900" dirty="0"/>
               <a:t>się narzędziem </a:t>
             </a:r>
             <a:r>
-              <a:rPr lang="pl-PL" sz="2900" smtClean="0"/>
+              <a:rPr lang="pl-PL" sz="2900" dirty="0" smtClean="0"/>
               <a:t/>
             </a:r>
             <a:br>
-              <a:rPr lang="pl-PL" sz="2900" smtClean="0"/>
+              <a:rPr lang="pl-PL" sz="2900" dirty="0" smtClean="0"/>
             </a:br>
             <a:r>
-              <a:rPr lang="pl-PL" sz="2900" smtClean="0"/>
-              <a:t>znacznie ułatwiającym </a:t>
-            </a:r>
-            <a:r>
               <a:rPr lang="pl-PL" sz="2900" dirty="0" smtClean="0"/>
-              <a:t>przegląd </a:t>
+              <a:t>znacznie ułatwiającym przegląd </a:t>
             </a:r>
             <a:r>
               <a:rPr lang="pl-PL" sz="2900" dirty="0"/>
@@ -4462,18 +5483,15 @@
             <a:endParaRPr lang="pl-PL" sz="2900" dirty="0" smtClean="0"/>
           </a:p>
           <a:p>
-            <a:pPr marL="0" indent="0">
-              <a:buNone/>
-            </a:pPr>
             <a:r>
               <a:rPr lang="pl-PL" sz="2900" dirty="0" smtClean="0"/>
               <a:t>Typowo wykorzystuje się takie etykiety jak:</a:t>
             </a:r>
           </a:p>
           <a:p>
-            <a:pPr fontAlgn="base"/>
-            <a:r>
-              <a:rPr lang="pl-PL" sz="2900" b="1" dirty="0" smtClean="0">
+            <a:pPr lvl="1" fontAlgn="base"/>
+            <a:r>
+              <a:rPr lang="pl-PL" sz="2500" b="1" dirty="0" smtClean="0">
                 <a:solidFill>
                   <a:srgbClr val="FF0000"/>
                 </a:solidFill>
@@ -4481,15 +5499,15 @@
               <a:t>Bug</a:t>
             </a:r>
             <a:r>
-              <a:rPr lang="pl-PL" sz="2900" dirty="0" smtClean="0"/>
+              <a:rPr lang="pl-PL" sz="2500" dirty="0" smtClean="0"/>
               <a:t> (błąd)</a:t>
             </a:r>
-            <a:endParaRPr lang="pl-PL" sz="2900" dirty="0"/>
-          </a:p>
-          <a:p>
-            <a:pPr fontAlgn="base"/>
-            <a:r>
-              <a:rPr lang="en-US" sz="2900" b="1" dirty="0" smtClean="0">
+            <a:endParaRPr lang="pl-PL" sz="2500" dirty="0"/>
+          </a:p>
+          <a:p>
+            <a:pPr lvl="1" fontAlgn="base"/>
+            <a:r>
+              <a:rPr lang="en-US" sz="2500" b="1" dirty="0" smtClean="0">
                 <a:solidFill>
                   <a:srgbClr val="FF0000"/>
                 </a:solidFill>
@@ -4497,7 +5515,7 @@
               <a:t>Confirmed</a:t>
             </a:r>
             <a:r>
-              <a:rPr lang="pl-PL" sz="2900" dirty="0" smtClean="0">
+              <a:rPr lang="pl-PL" sz="2500" dirty="0" smtClean="0">
                 <a:solidFill>
                   <a:srgbClr val="FF0000"/>
                 </a:solidFill>
@@ -4505,15 +5523,15 @@
               <a:t> </a:t>
             </a:r>
             <a:r>
-              <a:rPr lang="pl-PL" sz="2900" dirty="0" smtClean="0"/>
+              <a:rPr lang="pl-PL" sz="2500" dirty="0" smtClean="0"/>
               <a:t>(potwierdzony)</a:t>
             </a:r>
-            <a:endParaRPr lang="pl-PL" sz="2900" dirty="0"/>
-          </a:p>
-          <a:p>
-            <a:pPr fontAlgn="base"/>
-            <a:r>
-              <a:rPr lang="pl-PL" sz="2900" b="1" dirty="0">
+            <a:endParaRPr lang="pl-PL" sz="2500" dirty="0"/>
+          </a:p>
+          <a:p>
+            <a:pPr lvl="1" fontAlgn="base"/>
+            <a:r>
+              <a:rPr lang="pl-PL" sz="2500" b="1" dirty="0">
                 <a:solidFill>
                   <a:srgbClr val="FF0000"/>
                 </a:solidFill>
@@ -4521,15 +5539,15 @@
               <a:t>Critical</a:t>
             </a:r>
             <a:r>
-              <a:rPr lang="pl-PL" sz="2900" dirty="0" smtClean="0"/>
+              <a:rPr lang="pl-PL" sz="2500" dirty="0" smtClean="0"/>
               <a:t> (krytyczny)</a:t>
             </a:r>
-            <a:endParaRPr lang="pl-PL" sz="2900" dirty="0"/>
-          </a:p>
-          <a:p>
-            <a:pPr fontAlgn="base"/>
-            <a:r>
-              <a:rPr lang="en-US" sz="2900" b="1" dirty="0" smtClean="0">
+            <a:endParaRPr lang="pl-PL" sz="2500" dirty="0"/>
+          </a:p>
+          <a:p>
+            <a:pPr lvl="1" fontAlgn="base"/>
+            <a:r>
+              <a:rPr lang="en-US" sz="2500" b="1" dirty="0" smtClean="0">
                 <a:solidFill>
                   <a:srgbClr val="FF0000"/>
                 </a:solidFill>
@@ -4537,19 +5555,15 @@
               <a:t>Discussion</a:t>
             </a:r>
             <a:r>
-              <a:rPr lang="pl-PL" sz="2900" dirty="0" smtClean="0"/>
-              <a:t> </a:t>
-            </a:r>
-            <a:r>
-              <a:rPr lang="pl-PL" sz="2900" dirty="0" smtClean="0"/>
-              <a:t>(dyskusja)</a:t>
-            </a:r>
-            <a:endParaRPr lang="pl-PL" sz="2900" dirty="0"/>
-          </a:p>
-          <a:p>
-            <a:pPr fontAlgn="base"/>
-            <a:r>
-              <a:rPr lang="en-US" sz="2900" b="1" dirty="0" smtClean="0">
+              <a:rPr lang="pl-PL" sz="2500" dirty="0" smtClean="0"/>
+              <a:t> (dyskusja)</a:t>
+            </a:r>
+            <a:endParaRPr lang="pl-PL" sz="2500" dirty="0"/>
+          </a:p>
+          <a:p>
+            <a:pPr lvl="1" fontAlgn="base"/>
+            <a:r>
+              <a:rPr lang="en-US" sz="2500" b="1" dirty="0" smtClean="0">
                 <a:solidFill>
                   <a:srgbClr val="FF0000"/>
                 </a:solidFill>
@@ -4557,19 +5571,15 @@
               <a:t>Documentation</a:t>
             </a:r>
             <a:r>
-              <a:rPr lang="pl-PL" sz="2900" dirty="0" smtClean="0"/>
-              <a:t> </a:t>
-            </a:r>
-            <a:r>
-              <a:rPr lang="pl-PL" sz="2900" dirty="0" smtClean="0"/>
-              <a:t>(dokumentacja)</a:t>
-            </a:r>
-            <a:endParaRPr lang="pl-PL" sz="2900" dirty="0"/>
-          </a:p>
-          <a:p>
-            <a:pPr fontAlgn="base"/>
-            <a:r>
-              <a:rPr lang="pl-PL" sz="2900" b="1" dirty="0">
+              <a:rPr lang="pl-PL" sz="2500" dirty="0" smtClean="0"/>
+              <a:t> (dokumentacja)</a:t>
+            </a:r>
+            <a:endParaRPr lang="pl-PL" sz="2500" dirty="0"/>
+          </a:p>
+          <a:p>
+            <a:pPr lvl="1" fontAlgn="base"/>
+            <a:r>
+              <a:rPr lang="pl-PL" sz="2500" b="1" dirty="0">
                 <a:solidFill>
                   <a:srgbClr val="FF0000"/>
                 </a:solidFill>
@@ -4577,15 +5587,15 @@
               <a:t>Enhancement</a:t>
             </a:r>
             <a:r>
-              <a:rPr lang="pl-PL" sz="2900" dirty="0" smtClean="0"/>
+              <a:rPr lang="pl-PL" sz="2500" dirty="0" smtClean="0"/>
               <a:t> ( usprawnienie)</a:t>
             </a:r>
-            <a:endParaRPr lang="pl-PL" sz="2900" dirty="0"/>
-          </a:p>
-          <a:p>
-            <a:pPr fontAlgn="base"/>
-            <a:r>
-              <a:rPr lang="en-US" sz="2900" b="1" dirty="0" smtClean="0">
+            <a:endParaRPr lang="pl-PL" sz="2500" dirty="0"/>
+          </a:p>
+          <a:p>
+            <a:pPr lvl="1" fontAlgn="base"/>
+            <a:r>
+              <a:rPr lang="en-US" sz="2500" b="1" dirty="0" smtClean="0">
                 <a:solidFill>
                   <a:srgbClr val="FF0000"/>
                 </a:solidFill>
@@ -4593,19 +5603,15 @@
               <a:t>Suggestion</a:t>
             </a:r>
             <a:r>
-              <a:rPr lang="pl-PL" sz="2900" dirty="0" smtClean="0"/>
-              <a:t> </a:t>
-            </a:r>
-            <a:r>
-              <a:rPr lang="pl-PL" sz="2900" dirty="0" smtClean="0"/>
-              <a:t>(wskazówka)</a:t>
-            </a:r>
-            <a:endParaRPr lang="pl-PL" sz="2900" dirty="0"/>
-          </a:p>
-          <a:p>
-            <a:pPr fontAlgn="base"/>
-            <a:r>
-              <a:rPr lang="en-US" sz="2900" b="1" dirty="0" smtClean="0">
+              <a:rPr lang="pl-PL" sz="2500" dirty="0" smtClean="0"/>
+              <a:t> (wskazówka)</a:t>
+            </a:r>
+            <a:endParaRPr lang="pl-PL" sz="2500" dirty="0"/>
+          </a:p>
+          <a:p>
+            <a:pPr lvl="1" fontAlgn="base"/>
+            <a:r>
+              <a:rPr lang="en-US" sz="2500" b="1" dirty="0" smtClean="0">
                 <a:solidFill>
                   <a:srgbClr val="FF0000"/>
                 </a:solidFill>
@@ -4613,14 +5619,10 @@
               <a:t>Support</a:t>
             </a:r>
             <a:r>
-              <a:rPr lang="pl-PL" sz="2900" dirty="0" smtClean="0"/>
-              <a:t> </a:t>
-            </a:r>
-            <a:r>
-              <a:rPr lang="pl-PL" sz="2900" dirty="0" smtClean="0"/>
-              <a:t>(wsparcie)</a:t>
-            </a:r>
-            <a:endParaRPr lang="pl-PL" sz="2900" dirty="0"/>
+              <a:rPr lang="pl-PL" sz="2500" dirty="0" smtClean="0"/>
+              <a:t> (wsparcie)</a:t>
+            </a:r>
+            <a:endParaRPr lang="pl-PL" sz="2500" dirty="0"/>
           </a:p>
           <a:p>
             <a:pPr marL="0" indent="0">

</xml_diff>